<commit_message>
structure slide and animations
</commit_message>
<xml_diff>
--- a/MOCUIPlugin-final.pptx
+++ b/MOCUIPlugin-final.pptx
@@ -5,14 +5,15 @@
     <p:sldMasterId id="2147483648" r:id="rId2"/>
   </p:sldMasterIdLst>
   <p:notesMasterIdLst>
-    <p:notesMasterId r:id="rId8"/>
+    <p:notesMasterId r:id="rId9"/>
   </p:notesMasterIdLst>
   <p:sldIdLst>
     <p:sldId id="256" r:id="rId3"/>
     <p:sldId id="304" r:id="rId4"/>
     <p:sldId id="305" r:id="rId5"/>
     <p:sldId id="276" r:id="rId6"/>
-    <p:sldId id="278" r:id="rId7"/>
+    <p:sldId id="306" r:id="rId7"/>
+    <p:sldId id="278" r:id="rId8"/>
   </p:sldIdLst>
   <p:sldSz cx="9144000" cy="5143500" type="screen16x9"/>
   <p:notesSz cx="6858000" cy="9144000"/>
@@ -6019,6 +6020,9 @@
                     <p:cTn id="3" fill="hold">
                       <p:stCondLst>
                         <p:cond delay="indefinite"/>
+                        <p:cond evt="onBegin" delay="0">
+                          <p:tn val="2"/>
+                        </p:cond>
                       </p:stCondLst>
                       <p:childTnLst>
                         <p:par>
@@ -6028,7 +6032,7 @@
                             </p:stCondLst>
                             <p:childTnLst>
                               <p:par>
-                                <p:cTn id="5" presetID="10" presetClass="entr" presetSubtype="0" fill="hold" grpId="0" nodeType="clickEffect">
+                                <p:cTn id="5" presetID="10" presetClass="entr" presetSubtype="0" fill="hold" grpId="0" nodeType="withEffect">
                                   <p:stCondLst>
                                     <p:cond delay="0"/>
                                   </p:stCondLst>
@@ -12785,6 +12789,1965 @@
       </p:grpSpPr>
       <p:sp>
         <p:nvSpPr>
+          <p:cNvPr id="99" name="Freeform 98"/>
+          <p:cNvSpPr/>
+          <p:nvPr/>
+        </p:nvSpPr>
+        <p:spPr>
+          <a:xfrm>
+            <a:off x="1438275" y="1390650"/>
+            <a:ext cx="6505575" cy="361950"/>
+          </a:xfrm>
+          <a:custGeom>
+            <a:avLst/>
+            <a:gdLst>
+              <a:gd name="connsiteX0" fmla="*/ 0 w 6505575"/>
+              <a:gd name="connsiteY0" fmla="*/ 361950 h 361950"/>
+              <a:gd name="connsiteX1" fmla="*/ 3219450 w 6505575"/>
+              <a:gd name="connsiteY1" fmla="*/ 0 h 361950"/>
+              <a:gd name="connsiteX2" fmla="*/ 6505575 w 6505575"/>
+              <a:gd name="connsiteY2" fmla="*/ 361950 h 361950"/>
+              <a:gd name="connsiteX0" fmla="*/ 0 w 6505575"/>
+              <a:gd name="connsiteY0" fmla="*/ 361950 h 361950"/>
+              <a:gd name="connsiteX1" fmla="*/ 3219450 w 6505575"/>
+              <a:gd name="connsiteY1" fmla="*/ 0 h 361950"/>
+              <a:gd name="connsiteX2" fmla="*/ 6505575 w 6505575"/>
+              <a:gd name="connsiteY2" fmla="*/ 361950 h 361950"/>
+            </a:gdLst>
+            <a:ahLst/>
+            <a:cxnLst>
+              <a:cxn ang="0">
+                <a:pos x="connsiteX0" y="connsiteY0"/>
+              </a:cxn>
+              <a:cxn ang="0">
+                <a:pos x="connsiteX1" y="connsiteY1"/>
+              </a:cxn>
+              <a:cxn ang="0">
+                <a:pos x="connsiteX2" y="connsiteY2"/>
+              </a:cxn>
+            </a:cxnLst>
+            <a:rect l="l" t="t" r="r" b="b"/>
+            <a:pathLst>
+              <a:path w="6505575" h="361950">
+                <a:moveTo>
+                  <a:pt x="0" y="361950"/>
+                </a:moveTo>
+                <a:cubicBezTo>
+                  <a:pt x="1067594" y="180975"/>
+                  <a:pt x="2135188" y="0"/>
+                  <a:pt x="3219450" y="0"/>
+                </a:cubicBezTo>
+                <a:cubicBezTo>
+                  <a:pt x="4303712" y="0"/>
+                  <a:pt x="5404643" y="180975"/>
+                  <a:pt x="6505575" y="361950"/>
+                </a:cubicBezTo>
+              </a:path>
+            </a:pathLst>
+          </a:custGeom>
+          <a:noFill/>
+          <a:ln w="38100">
+            <a:solidFill>
+              <a:srgbClr val="00B0F0"/>
+            </a:solidFill>
+          </a:ln>
+        </p:spPr>
+        <p:style>
+          <a:lnRef idx="2">
+            <a:schemeClr val="accent1">
+              <a:shade val="50000"/>
+            </a:schemeClr>
+          </a:lnRef>
+          <a:fillRef idx="1">
+            <a:schemeClr val="accent1"/>
+          </a:fillRef>
+          <a:effectRef idx="0">
+            <a:schemeClr val="accent1"/>
+          </a:effectRef>
+          <a:fontRef idx="minor">
+            <a:schemeClr val="lt1"/>
+          </a:fontRef>
+        </p:style>
+        <p:txBody>
+          <a:bodyPr rtlCol="0" anchor="ctr"/>
+          <a:lstStyle/>
+          <a:p>
+            <a:pPr algn="ctr"/>
+            <a:endParaRPr lang="en-US"/>
+          </a:p>
+        </p:txBody>
+      </p:sp>
+      <p:cxnSp>
+        <p:nvCxnSpPr>
+          <p:cNvPr id="60" name="Straight Connector 59"/>
+          <p:cNvCxnSpPr/>
+          <p:nvPr/>
+        </p:nvCxnSpPr>
+        <p:spPr>
+          <a:xfrm>
+            <a:off x="1472227" y="3952062"/>
+            <a:ext cx="1" cy="219888"/>
+          </a:xfrm>
+          <a:prstGeom prst="line">
+            <a:avLst/>
+          </a:prstGeom>
+          <a:ln w="38100"/>
+        </p:spPr>
+        <p:style>
+          <a:lnRef idx="1">
+            <a:schemeClr val="accent1"/>
+          </a:lnRef>
+          <a:fillRef idx="0">
+            <a:schemeClr val="accent1"/>
+          </a:fillRef>
+          <a:effectRef idx="0">
+            <a:schemeClr val="accent1"/>
+          </a:effectRef>
+          <a:fontRef idx="minor">
+            <a:schemeClr val="tx1"/>
+          </a:fontRef>
+        </p:style>
+      </p:cxnSp>
+      <p:cxnSp>
+        <p:nvCxnSpPr>
+          <p:cNvPr id="62" name="Straight Connector 61"/>
+          <p:cNvCxnSpPr/>
+          <p:nvPr/>
+        </p:nvCxnSpPr>
+        <p:spPr>
+          <a:xfrm>
+            <a:off x="1472227" y="2952989"/>
+            <a:ext cx="1" cy="219888"/>
+          </a:xfrm>
+          <a:prstGeom prst="line">
+            <a:avLst/>
+          </a:prstGeom>
+          <a:ln w="38100"/>
+        </p:spPr>
+        <p:style>
+          <a:lnRef idx="1">
+            <a:schemeClr val="accent1"/>
+          </a:lnRef>
+          <a:fillRef idx="0">
+            <a:schemeClr val="accent1"/>
+          </a:fillRef>
+          <a:effectRef idx="0">
+            <a:schemeClr val="accent1"/>
+          </a:effectRef>
+          <a:fontRef idx="minor">
+            <a:schemeClr val="tx1"/>
+          </a:fontRef>
+        </p:style>
+      </p:cxnSp>
+      <p:sp>
+        <p:nvSpPr>
+          <p:cNvPr id="2" name="Title 1"/>
+          <p:cNvSpPr>
+            <a:spLocks noGrp="1"/>
+          </p:cNvSpPr>
+          <p:nvPr>
+            <p:ph type="title"/>
+          </p:nvPr>
+        </p:nvSpPr>
+        <p:spPr/>
+        <p:txBody>
+          <a:bodyPr/>
+          <a:lstStyle/>
+          <a:p>
+            <a:r>
+              <a:rPr lang="en-US" dirty="0" err="1" smtClean="0"/>
+              <a:t>HaaS</a:t>
+            </a:r>
+            <a:r>
+              <a:rPr lang="en-US" dirty="0" smtClean="0"/>
+              <a:t> Structure</a:t>
+            </a:r>
+            <a:endParaRPr lang="en-US" dirty="0"/>
+          </a:p>
+        </p:txBody>
+      </p:sp>
+      <p:sp>
+        <p:nvSpPr>
+          <p:cNvPr id="15" name="Freeform 14"/>
+          <p:cNvSpPr/>
+          <p:nvPr/>
+        </p:nvSpPr>
+        <p:spPr>
+          <a:xfrm>
+            <a:off x="3733800" y="1736677"/>
+            <a:ext cx="2027187" cy="1216312"/>
+          </a:xfrm>
+          <a:custGeom>
+            <a:avLst/>
+            <a:gdLst>
+              <a:gd name="connsiteX0" fmla="*/ 0 w 2027187"/>
+              <a:gd name="connsiteY0" fmla="*/ 0 h 1216312"/>
+              <a:gd name="connsiteX1" fmla="*/ 2027187 w 2027187"/>
+              <a:gd name="connsiteY1" fmla="*/ 0 h 1216312"/>
+              <a:gd name="connsiteX2" fmla="*/ 2027187 w 2027187"/>
+              <a:gd name="connsiteY2" fmla="*/ 1216312 h 1216312"/>
+              <a:gd name="connsiteX3" fmla="*/ 0 w 2027187"/>
+              <a:gd name="connsiteY3" fmla="*/ 1216312 h 1216312"/>
+              <a:gd name="connsiteX4" fmla="*/ 0 w 2027187"/>
+              <a:gd name="connsiteY4" fmla="*/ 0 h 1216312"/>
+            </a:gdLst>
+            <a:ahLst/>
+            <a:cxnLst>
+              <a:cxn ang="0">
+                <a:pos x="connsiteX0" y="connsiteY0"/>
+              </a:cxn>
+              <a:cxn ang="0">
+                <a:pos x="connsiteX1" y="connsiteY1"/>
+              </a:cxn>
+              <a:cxn ang="0">
+                <a:pos x="connsiteX2" y="connsiteY2"/>
+              </a:cxn>
+              <a:cxn ang="0">
+                <a:pos x="connsiteX3" y="connsiteY3"/>
+              </a:cxn>
+              <a:cxn ang="0">
+                <a:pos x="connsiteX4" y="connsiteY4"/>
+              </a:cxn>
+            </a:cxnLst>
+            <a:rect l="l" t="t" r="r" b="b"/>
+            <a:pathLst>
+              <a:path w="2027187" h="1216312">
+                <a:moveTo>
+                  <a:pt x="0" y="0"/>
+                </a:moveTo>
+                <a:lnTo>
+                  <a:pt x="2027187" y="0"/>
+                </a:lnTo>
+                <a:lnTo>
+                  <a:pt x="2027187" y="1216312"/>
+                </a:lnTo>
+                <a:lnTo>
+                  <a:pt x="0" y="1216312"/>
+                </a:lnTo>
+                <a:lnTo>
+                  <a:pt x="0" y="0"/>
+                </a:lnTo>
+                <a:close/>
+              </a:path>
+            </a:pathLst>
+          </a:custGeom>
+          <a:solidFill>
+            <a:schemeClr val="accent3"/>
+          </a:solidFill>
+        </p:spPr>
+        <p:style>
+          <a:lnRef idx="2">
+            <a:schemeClr val="lt1">
+              <a:hueOff val="0"/>
+              <a:satOff val="0"/>
+              <a:lumOff val="0"/>
+              <a:alphaOff val="0"/>
+            </a:schemeClr>
+          </a:lnRef>
+          <a:fillRef idx="1">
+            <a:schemeClr val="accent1">
+              <a:hueOff val="0"/>
+              <a:satOff val="0"/>
+              <a:lumOff val="0"/>
+              <a:alphaOff val="0"/>
+            </a:schemeClr>
+          </a:fillRef>
+          <a:effectRef idx="0">
+            <a:schemeClr val="accent1">
+              <a:hueOff val="0"/>
+              <a:satOff val="0"/>
+              <a:lumOff val="0"/>
+              <a:alphaOff val="0"/>
+            </a:schemeClr>
+          </a:effectRef>
+          <a:fontRef idx="minor">
+            <a:schemeClr val="lt1"/>
+          </a:fontRef>
+        </p:style>
+        <p:txBody>
+          <a:bodyPr spcFirstLastPara="0" vert="horz" wrap="square" lIns="118110" tIns="118110" rIns="118110" bIns="118110" numCol="1" spcCol="1270" anchor="ctr" anchorCtr="0">
+            <a:noAutofit/>
+          </a:bodyPr>
+          <a:lstStyle/>
+          <a:p>
+            <a:pPr lvl="0" algn="ctr" defTabSz="1377950">
+              <a:lnSpc>
+                <a:spcPct val="90000"/>
+              </a:lnSpc>
+              <a:spcBef>
+                <a:spcPct val="0"/>
+              </a:spcBef>
+              <a:spcAft>
+                <a:spcPct val="35000"/>
+              </a:spcAft>
+            </a:pPr>
+            <a:r>
+              <a:rPr lang="en-US" sz="3100" kern="1200" dirty="0" smtClean="0"/>
+              <a:t>Nodes</a:t>
+            </a:r>
+            <a:endParaRPr lang="en-US" sz="3100" kern="1200" dirty="0"/>
+          </a:p>
+        </p:txBody>
+      </p:sp>
+      <p:sp>
+        <p:nvSpPr>
+          <p:cNvPr id="16" name="Freeform 15"/>
+          <p:cNvSpPr/>
+          <p:nvPr/>
+        </p:nvSpPr>
+        <p:spPr>
+          <a:xfrm>
+            <a:off x="5638800" y="3127511"/>
+            <a:ext cx="1384609" cy="830765"/>
+          </a:xfrm>
+          <a:custGeom>
+            <a:avLst/>
+            <a:gdLst>
+              <a:gd name="connsiteX0" fmla="*/ 0 w 1384609"/>
+              <a:gd name="connsiteY0" fmla="*/ 0 h 830765"/>
+              <a:gd name="connsiteX1" fmla="*/ 1384609 w 1384609"/>
+              <a:gd name="connsiteY1" fmla="*/ 0 h 830765"/>
+              <a:gd name="connsiteX2" fmla="*/ 1384609 w 1384609"/>
+              <a:gd name="connsiteY2" fmla="*/ 830765 h 830765"/>
+              <a:gd name="connsiteX3" fmla="*/ 0 w 1384609"/>
+              <a:gd name="connsiteY3" fmla="*/ 830765 h 830765"/>
+              <a:gd name="connsiteX4" fmla="*/ 0 w 1384609"/>
+              <a:gd name="connsiteY4" fmla="*/ 0 h 830765"/>
+            </a:gdLst>
+            <a:ahLst/>
+            <a:cxnLst>
+              <a:cxn ang="0">
+                <a:pos x="connsiteX0" y="connsiteY0"/>
+              </a:cxn>
+              <a:cxn ang="0">
+                <a:pos x="connsiteX1" y="connsiteY1"/>
+              </a:cxn>
+              <a:cxn ang="0">
+                <a:pos x="connsiteX2" y="connsiteY2"/>
+              </a:cxn>
+              <a:cxn ang="0">
+                <a:pos x="connsiteX3" y="connsiteY3"/>
+              </a:cxn>
+              <a:cxn ang="0">
+                <a:pos x="connsiteX4" y="connsiteY4"/>
+              </a:cxn>
+            </a:cxnLst>
+            <a:rect l="l" t="t" r="r" b="b"/>
+            <a:pathLst>
+              <a:path w="1384609" h="830765">
+                <a:moveTo>
+                  <a:pt x="0" y="0"/>
+                </a:moveTo>
+                <a:lnTo>
+                  <a:pt x="1384609" y="0"/>
+                </a:lnTo>
+                <a:lnTo>
+                  <a:pt x="1384609" y="830765"/>
+                </a:lnTo>
+                <a:lnTo>
+                  <a:pt x="0" y="830765"/>
+                </a:lnTo>
+                <a:lnTo>
+                  <a:pt x="0" y="0"/>
+                </a:lnTo>
+                <a:close/>
+              </a:path>
+            </a:pathLst>
+          </a:custGeom>
+          <a:solidFill>
+            <a:srgbClr val="FF0066"/>
+          </a:solidFill>
+        </p:spPr>
+        <p:style>
+          <a:lnRef idx="2">
+            <a:schemeClr val="lt1">
+              <a:hueOff val="0"/>
+              <a:satOff val="0"/>
+              <a:lumOff val="0"/>
+              <a:alphaOff val="0"/>
+            </a:schemeClr>
+          </a:lnRef>
+          <a:fillRef idx="1">
+            <a:schemeClr val="accent1">
+              <a:hueOff val="0"/>
+              <a:satOff val="0"/>
+              <a:lumOff val="0"/>
+              <a:alphaOff val="0"/>
+            </a:schemeClr>
+          </a:fillRef>
+          <a:effectRef idx="0">
+            <a:schemeClr val="accent1">
+              <a:hueOff val="0"/>
+              <a:satOff val="0"/>
+              <a:lumOff val="0"/>
+              <a:alphaOff val="0"/>
+            </a:schemeClr>
+          </a:effectRef>
+          <a:fontRef idx="minor">
+            <a:schemeClr val="lt1"/>
+          </a:fontRef>
+        </p:style>
+        <p:txBody>
+          <a:bodyPr spcFirstLastPara="0" vert="horz" wrap="square" lIns="118110" tIns="118110" rIns="118110" bIns="118110" numCol="1" spcCol="1270" anchor="ctr" anchorCtr="0">
+            <a:noAutofit/>
+          </a:bodyPr>
+          <a:lstStyle/>
+          <a:p>
+            <a:pPr lvl="0" algn="ctr" defTabSz="1377950">
+              <a:lnSpc>
+                <a:spcPct val="90000"/>
+              </a:lnSpc>
+              <a:spcBef>
+                <a:spcPct val="0"/>
+              </a:spcBef>
+              <a:spcAft>
+                <a:spcPct val="35000"/>
+              </a:spcAft>
+            </a:pPr>
+            <a:r>
+              <a:rPr lang="en-US" sz="3100" kern="1200" dirty="0" smtClean="0"/>
+              <a:t>NICs</a:t>
+            </a:r>
+            <a:endParaRPr lang="en-US" sz="3100" kern="1200" dirty="0"/>
+          </a:p>
+        </p:txBody>
+      </p:sp>
+      <p:sp>
+        <p:nvSpPr>
+          <p:cNvPr id="20" name="Freeform 19"/>
+          <p:cNvSpPr/>
+          <p:nvPr/>
+        </p:nvSpPr>
+        <p:spPr>
+          <a:xfrm>
+            <a:off x="4451624" y="4192098"/>
+            <a:ext cx="1351027" cy="810617"/>
+          </a:xfrm>
+          <a:custGeom>
+            <a:avLst/>
+            <a:gdLst>
+              <a:gd name="connsiteX0" fmla="*/ 0 w 1523066"/>
+              <a:gd name="connsiteY0" fmla="*/ 0 h 913840"/>
+              <a:gd name="connsiteX1" fmla="*/ 1523066 w 1523066"/>
+              <a:gd name="connsiteY1" fmla="*/ 0 h 913840"/>
+              <a:gd name="connsiteX2" fmla="*/ 1523066 w 1523066"/>
+              <a:gd name="connsiteY2" fmla="*/ 913840 h 913840"/>
+              <a:gd name="connsiteX3" fmla="*/ 0 w 1523066"/>
+              <a:gd name="connsiteY3" fmla="*/ 913840 h 913840"/>
+              <a:gd name="connsiteX4" fmla="*/ 0 w 1523066"/>
+              <a:gd name="connsiteY4" fmla="*/ 0 h 913840"/>
+            </a:gdLst>
+            <a:ahLst/>
+            <a:cxnLst>
+              <a:cxn ang="0">
+                <a:pos x="connsiteX0" y="connsiteY0"/>
+              </a:cxn>
+              <a:cxn ang="0">
+                <a:pos x="connsiteX1" y="connsiteY1"/>
+              </a:cxn>
+              <a:cxn ang="0">
+                <a:pos x="connsiteX2" y="connsiteY2"/>
+              </a:cxn>
+              <a:cxn ang="0">
+                <a:pos x="connsiteX3" y="connsiteY3"/>
+              </a:cxn>
+              <a:cxn ang="0">
+                <a:pos x="connsiteX4" y="connsiteY4"/>
+              </a:cxn>
+            </a:cxnLst>
+            <a:rect l="l" t="t" r="r" b="b"/>
+            <a:pathLst>
+              <a:path w="1523066" h="913840">
+                <a:moveTo>
+                  <a:pt x="0" y="0"/>
+                </a:moveTo>
+                <a:lnTo>
+                  <a:pt x="1523066" y="0"/>
+                </a:lnTo>
+                <a:lnTo>
+                  <a:pt x="1523066" y="913840"/>
+                </a:lnTo>
+                <a:lnTo>
+                  <a:pt x="0" y="913840"/>
+                </a:lnTo>
+                <a:lnTo>
+                  <a:pt x="0" y="0"/>
+                </a:lnTo>
+                <a:close/>
+              </a:path>
+            </a:pathLst>
+          </a:custGeom>
+          <a:solidFill>
+            <a:schemeClr val="accent6">
+              <a:lumMod val="75000"/>
+            </a:schemeClr>
+          </a:solidFill>
+        </p:spPr>
+        <p:style>
+          <a:lnRef idx="2">
+            <a:schemeClr val="lt1">
+              <a:hueOff val="0"/>
+              <a:satOff val="0"/>
+              <a:lumOff val="0"/>
+              <a:alphaOff val="0"/>
+            </a:schemeClr>
+          </a:lnRef>
+          <a:fillRef idx="1">
+            <a:schemeClr val="accent1">
+              <a:hueOff val="0"/>
+              <a:satOff val="0"/>
+              <a:lumOff val="0"/>
+              <a:alphaOff val="0"/>
+            </a:schemeClr>
+          </a:fillRef>
+          <a:effectRef idx="0">
+            <a:schemeClr val="accent1">
+              <a:hueOff val="0"/>
+              <a:satOff val="0"/>
+              <a:lumOff val="0"/>
+              <a:alphaOff val="0"/>
+            </a:schemeClr>
+          </a:effectRef>
+          <a:fontRef idx="minor">
+            <a:schemeClr val="lt1"/>
+          </a:fontRef>
+        </p:style>
+        <p:txBody>
+          <a:bodyPr spcFirstLastPara="0" vert="horz" wrap="square" lIns="118110" tIns="118110" rIns="118110" bIns="118110" numCol="1" spcCol="1270" anchor="ctr" anchorCtr="0">
+            <a:noAutofit/>
+          </a:bodyPr>
+          <a:lstStyle/>
+          <a:p>
+            <a:pPr lvl="0" algn="ctr" defTabSz="1377950">
+              <a:lnSpc>
+                <a:spcPct val="90000"/>
+              </a:lnSpc>
+              <a:spcBef>
+                <a:spcPct val="0"/>
+              </a:spcBef>
+              <a:spcAft>
+                <a:spcPct val="35000"/>
+              </a:spcAft>
+            </a:pPr>
+            <a:r>
+              <a:rPr lang="en-US" sz="3100" kern="1200" dirty="0" smtClean="0"/>
+              <a:t>HNICs</a:t>
+            </a:r>
+            <a:endParaRPr lang="en-US" sz="3100" kern="1200" dirty="0"/>
+          </a:p>
+        </p:txBody>
+      </p:sp>
+      <p:sp>
+        <p:nvSpPr>
+          <p:cNvPr id="21" name="Freeform 20"/>
+          <p:cNvSpPr/>
+          <p:nvPr/>
+        </p:nvSpPr>
+        <p:spPr>
+          <a:xfrm>
+            <a:off x="779923" y="3121297"/>
+            <a:ext cx="1384609" cy="830765"/>
+          </a:xfrm>
+          <a:custGeom>
+            <a:avLst/>
+            <a:gdLst>
+              <a:gd name="connsiteX0" fmla="*/ 0 w 1384609"/>
+              <a:gd name="connsiteY0" fmla="*/ 0 h 830765"/>
+              <a:gd name="connsiteX1" fmla="*/ 1384609 w 1384609"/>
+              <a:gd name="connsiteY1" fmla="*/ 0 h 830765"/>
+              <a:gd name="connsiteX2" fmla="*/ 1384609 w 1384609"/>
+              <a:gd name="connsiteY2" fmla="*/ 830765 h 830765"/>
+              <a:gd name="connsiteX3" fmla="*/ 0 w 1384609"/>
+              <a:gd name="connsiteY3" fmla="*/ 830765 h 830765"/>
+              <a:gd name="connsiteX4" fmla="*/ 0 w 1384609"/>
+              <a:gd name="connsiteY4" fmla="*/ 0 h 830765"/>
+            </a:gdLst>
+            <a:ahLst/>
+            <a:cxnLst>
+              <a:cxn ang="0">
+                <a:pos x="connsiteX0" y="connsiteY0"/>
+              </a:cxn>
+              <a:cxn ang="0">
+                <a:pos x="connsiteX1" y="connsiteY1"/>
+              </a:cxn>
+              <a:cxn ang="0">
+                <a:pos x="connsiteX2" y="connsiteY2"/>
+              </a:cxn>
+              <a:cxn ang="0">
+                <a:pos x="connsiteX3" y="connsiteY3"/>
+              </a:cxn>
+              <a:cxn ang="0">
+                <a:pos x="connsiteX4" y="connsiteY4"/>
+              </a:cxn>
+            </a:cxnLst>
+            <a:rect l="l" t="t" r="r" b="b"/>
+            <a:pathLst>
+              <a:path w="1384609" h="830765">
+                <a:moveTo>
+                  <a:pt x="0" y="0"/>
+                </a:moveTo>
+                <a:lnTo>
+                  <a:pt x="1384609" y="0"/>
+                </a:lnTo>
+                <a:lnTo>
+                  <a:pt x="1384609" y="830765"/>
+                </a:lnTo>
+                <a:lnTo>
+                  <a:pt x="0" y="830765"/>
+                </a:lnTo>
+                <a:lnTo>
+                  <a:pt x="0" y="0"/>
+                </a:lnTo>
+                <a:close/>
+              </a:path>
+            </a:pathLst>
+          </a:custGeom>
+          <a:solidFill>
+            <a:schemeClr val="accent2">
+              <a:lumMod val="50000"/>
+            </a:schemeClr>
+          </a:solidFill>
+        </p:spPr>
+        <p:style>
+          <a:lnRef idx="2">
+            <a:schemeClr val="lt1">
+              <a:hueOff val="0"/>
+              <a:satOff val="0"/>
+              <a:lumOff val="0"/>
+              <a:alphaOff val="0"/>
+            </a:schemeClr>
+          </a:lnRef>
+          <a:fillRef idx="1">
+            <a:schemeClr val="accent1">
+              <a:hueOff val="0"/>
+              <a:satOff val="0"/>
+              <a:lumOff val="0"/>
+              <a:alphaOff val="0"/>
+            </a:schemeClr>
+          </a:fillRef>
+          <a:effectRef idx="0">
+            <a:schemeClr val="accent1">
+              <a:hueOff val="0"/>
+              <a:satOff val="0"/>
+              <a:lumOff val="0"/>
+              <a:alphaOff val="0"/>
+            </a:schemeClr>
+          </a:effectRef>
+          <a:fontRef idx="minor">
+            <a:schemeClr val="lt1"/>
+          </a:fontRef>
+        </p:style>
+        <p:txBody>
+          <a:bodyPr spcFirstLastPara="0" vert="horz" wrap="square" lIns="118110" tIns="118110" rIns="118110" bIns="118110" numCol="1" spcCol="1270" anchor="ctr" anchorCtr="0">
+            <a:noAutofit/>
+          </a:bodyPr>
+          <a:lstStyle/>
+          <a:p>
+            <a:pPr lvl="0" algn="ctr" defTabSz="1377950">
+              <a:lnSpc>
+                <a:spcPct val="90000"/>
+              </a:lnSpc>
+              <a:spcBef>
+                <a:spcPct val="0"/>
+              </a:spcBef>
+              <a:spcAft>
+                <a:spcPct val="35000"/>
+              </a:spcAft>
+            </a:pPr>
+            <a:r>
+              <a:rPr lang="en-US" sz="2800" dirty="0" smtClean="0"/>
+              <a:t>Head-nodes</a:t>
+            </a:r>
+            <a:endParaRPr lang="en-US" dirty="0"/>
+          </a:p>
+        </p:txBody>
+      </p:sp>
+      <p:sp>
+        <p:nvSpPr>
+          <p:cNvPr id="22" name="Freeform 21"/>
+          <p:cNvSpPr/>
+          <p:nvPr/>
+        </p:nvSpPr>
+        <p:spPr>
+          <a:xfrm>
+            <a:off x="779923" y="4171950"/>
+            <a:ext cx="1384609" cy="830765"/>
+          </a:xfrm>
+          <a:custGeom>
+            <a:avLst/>
+            <a:gdLst>
+              <a:gd name="connsiteX0" fmla="*/ 0 w 1384609"/>
+              <a:gd name="connsiteY0" fmla="*/ 0 h 830765"/>
+              <a:gd name="connsiteX1" fmla="*/ 1384609 w 1384609"/>
+              <a:gd name="connsiteY1" fmla="*/ 0 h 830765"/>
+              <a:gd name="connsiteX2" fmla="*/ 1384609 w 1384609"/>
+              <a:gd name="connsiteY2" fmla="*/ 830765 h 830765"/>
+              <a:gd name="connsiteX3" fmla="*/ 0 w 1384609"/>
+              <a:gd name="connsiteY3" fmla="*/ 830765 h 830765"/>
+              <a:gd name="connsiteX4" fmla="*/ 0 w 1384609"/>
+              <a:gd name="connsiteY4" fmla="*/ 0 h 830765"/>
+            </a:gdLst>
+            <a:ahLst/>
+            <a:cxnLst>
+              <a:cxn ang="0">
+                <a:pos x="connsiteX0" y="connsiteY0"/>
+              </a:cxn>
+              <a:cxn ang="0">
+                <a:pos x="connsiteX1" y="connsiteY1"/>
+              </a:cxn>
+              <a:cxn ang="0">
+                <a:pos x="connsiteX2" y="connsiteY2"/>
+              </a:cxn>
+              <a:cxn ang="0">
+                <a:pos x="connsiteX3" y="connsiteY3"/>
+              </a:cxn>
+              <a:cxn ang="0">
+                <a:pos x="connsiteX4" y="connsiteY4"/>
+              </a:cxn>
+            </a:cxnLst>
+            <a:rect l="l" t="t" r="r" b="b"/>
+            <a:pathLst>
+              <a:path w="1384609" h="830765">
+                <a:moveTo>
+                  <a:pt x="0" y="0"/>
+                </a:moveTo>
+                <a:lnTo>
+                  <a:pt x="1384609" y="0"/>
+                </a:lnTo>
+                <a:lnTo>
+                  <a:pt x="1384609" y="830765"/>
+                </a:lnTo>
+                <a:lnTo>
+                  <a:pt x="0" y="830765"/>
+                </a:lnTo>
+                <a:lnTo>
+                  <a:pt x="0" y="0"/>
+                </a:lnTo>
+                <a:close/>
+              </a:path>
+            </a:pathLst>
+          </a:custGeom>
+          <a:solidFill>
+            <a:schemeClr val="accent2">
+              <a:lumMod val="75000"/>
+            </a:schemeClr>
+          </a:solidFill>
+        </p:spPr>
+        <p:style>
+          <a:lnRef idx="2">
+            <a:schemeClr val="lt1">
+              <a:hueOff val="0"/>
+              <a:satOff val="0"/>
+              <a:lumOff val="0"/>
+              <a:alphaOff val="0"/>
+            </a:schemeClr>
+          </a:lnRef>
+          <a:fillRef idx="1">
+            <a:schemeClr val="accent1">
+              <a:hueOff val="0"/>
+              <a:satOff val="0"/>
+              <a:lumOff val="0"/>
+              <a:alphaOff val="0"/>
+            </a:schemeClr>
+          </a:fillRef>
+          <a:effectRef idx="0">
+            <a:schemeClr val="accent1">
+              <a:hueOff val="0"/>
+              <a:satOff val="0"/>
+              <a:lumOff val="0"/>
+              <a:alphaOff val="0"/>
+            </a:schemeClr>
+          </a:effectRef>
+          <a:fontRef idx="minor">
+            <a:schemeClr val="lt1"/>
+          </a:fontRef>
+        </p:style>
+        <p:txBody>
+          <a:bodyPr spcFirstLastPara="0" vert="horz" wrap="square" lIns="118110" tIns="118110" rIns="118110" bIns="118110" numCol="1" spcCol="1270" anchor="ctr" anchorCtr="0">
+            <a:noAutofit/>
+          </a:bodyPr>
+          <a:lstStyle/>
+          <a:p>
+            <a:pPr lvl="0" algn="ctr" defTabSz="1377950">
+              <a:lnSpc>
+                <a:spcPct val="90000"/>
+              </a:lnSpc>
+              <a:spcBef>
+                <a:spcPct val="0"/>
+              </a:spcBef>
+              <a:spcAft>
+                <a:spcPct val="35000"/>
+              </a:spcAft>
+            </a:pPr>
+            <a:r>
+              <a:rPr lang="en-US" sz="3100" kern="1200" dirty="0" smtClean="0"/>
+              <a:t>Base Images</a:t>
+            </a:r>
+            <a:endParaRPr lang="en-US" sz="3100" kern="1200" dirty="0"/>
+          </a:p>
+        </p:txBody>
+      </p:sp>
+      <p:sp>
+        <p:nvSpPr>
+          <p:cNvPr id="17" name="Freeform 16"/>
+          <p:cNvSpPr/>
+          <p:nvPr/>
+        </p:nvSpPr>
+        <p:spPr>
+          <a:xfrm>
+            <a:off x="6874951" y="1736677"/>
+            <a:ext cx="2027187" cy="1216312"/>
+          </a:xfrm>
+          <a:custGeom>
+            <a:avLst/>
+            <a:gdLst>
+              <a:gd name="connsiteX0" fmla="*/ 0 w 2027187"/>
+              <a:gd name="connsiteY0" fmla="*/ 0 h 1216312"/>
+              <a:gd name="connsiteX1" fmla="*/ 2027187 w 2027187"/>
+              <a:gd name="connsiteY1" fmla="*/ 0 h 1216312"/>
+              <a:gd name="connsiteX2" fmla="*/ 2027187 w 2027187"/>
+              <a:gd name="connsiteY2" fmla="*/ 1216312 h 1216312"/>
+              <a:gd name="connsiteX3" fmla="*/ 0 w 2027187"/>
+              <a:gd name="connsiteY3" fmla="*/ 1216312 h 1216312"/>
+              <a:gd name="connsiteX4" fmla="*/ 0 w 2027187"/>
+              <a:gd name="connsiteY4" fmla="*/ 0 h 1216312"/>
+            </a:gdLst>
+            <a:ahLst/>
+            <a:cxnLst>
+              <a:cxn ang="0">
+                <a:pos x="connsiteX0" y="connsiteY0"/>
+              </a:cxn>
+              <a:cxn ang="0">
+                <a:pos x="connsiteX1" y="connsiteY1"/>
+              </a:cxn>
+              <a:cxn ang="0">
+                <a:pos x="connsiteX2" y="connsiteY2"/>
+              </a:cxn>
+              <a:cxn ang="0">
+                <a:pos x="connsiteX3" y="connsiteY3"/>
+              </a:cxn>
+              <a:cxn ang="0">
+                <a:pos x="connsiteX4" y="connsiteY4"/>
+              </a:cxn>
+            </a:cxnLst>
+            <a:rect l="l" t="t" r="r" b="b"/>
+            <a:pathLst>
+              <a:path w="2027187" h="1216312">
+                <a:moveTo>
+                  <a:pt x="0" y="0"/>
+                </a:moveTo>
+                <a:lnTo>
+                  <a:pt x="2027187" y="0"/>
+                </a:lnTo>
+                <a:lnTo>
+                  <a:pt x="2027187" y="1216312"/>
+                </a:lnTo>
+                <a:lnTo>
+                  <a:pt x="0" y="1216312"/>
+                </a:lnTo>
+                <a:lnTo>
+                  <a:pt x="0" y="0"/>
+                </a:lnTo>
+                <a:close/>
+              </a:path>
+            </a:pathLst>
+          </a:custGeom>
+          <a:solidFill>
+            <a:schemeClr val="accent5"/>
+          </a:solidFill>
+        </p:spPr>
+        <p:style>
+          <a:lnRef idx="2">
+            <a:schemeClr val="lt1">
+              <a:hueOff val="0"/>
+              <a:satOff val="0"/>
+              <a:lumOff val="0"/>
+              <a:alphaOff val="0"/>
+            </a:schemeClr>
+          </a:lnRef>
+          <a:fillRef idx="1">
+            <a:schemeClr val="accent1">
+              <a:hueOff val="0"/>
+              <a:satOff val="0"/>
+              <a:lumOff val="0"/>
+              <a:alphaOff val="0"/>
+            </a:schemeClr>
+          </a:fillRef>
+          <a:effectRef idx="0">
+            <a:schemeClr val="accent1">
+              <a:hueOff val="0"/>
+              <a:satOff val="0"/>
+              <a:lumOff val="0"/>
+              <a:alphaOff val="0"/>
+            </a:schemeClr>
+          </a:effectRef>
+          <a:fontRef idx="minor">
+            <a:schemeClr val="lt1"/>
+          </a:fontRef>
+        </p:style>
+        <p:txBody>
+          <a:bodyPr spcFirstLastPara="0" vert="horz" wrap="square" lIns="118110" tIns="118110" rIns="118110" bIns="118110" numCol="1" spcCol="1270" anchor="ctr" anchorCtr="0">
+            <a:noAutofit/>
+          </a:bodyPr>
+          <a:lstStyle/>
+          <a:p>
+            <a:pPr lvl="0" algn="ctr" defTabSz="1377950">
+              <a:lnSpc>
+                <a:spcPct val="90000"/>
+              </a:lnSpc>
+              <a:spcBef>
+                <a:spcPct val="0"/>
+              </a:spcBef>
+              <a:spcAft>
+                <a:spcPct val="35000"/>
+              </a:spcAft>
+            </a:pPr>
+            <a:r>
+              <a:rPr lang="en-US" sz="3100" kern="1200" dirty="0" smtClean="0"/>
+              <a:t>Networks</a:t>
+            </a:r>
+            <a:endParaRPr lang="en-US" sz="3100" kern="1200" dirty="0"/>
+          </a:p>
+        </p:txBody>
+      </p:sp>
+      <p:sp>
+        <p:nvSpPr>
+          <p:cNvPr id="14" name="Freeform 13"/>
+          <p:cNvSpPr/>
+          <p:nvPr/>
+        </p:nvSpPr>
+        <p:spPr>
+          <a:xfrm>
+            <a:off x="458635" y="1736677"/>
+            <a:ext cx="2027187" cy="1216312"/>
+          </a:xfrm>
+          <a:custGeom>
+            <a:avLst/>
+            <a:gdLst>
+              <a:gd name="connsiteX0" fmla="*/ 0 w 2027187"/>
+              <a:gd name="connsiteY0" fmla="*/ 0 h 1216312"/>
+              <a:gd name="connsiteX1" fmla="*/ 2027187 w 2027187"/>
+              <a:gd name="connsiteY1" fmla="*/ 0 h 1216312"/>
+              <a:gd name="connsiteX2" fmla="*/ 2027187 w 2027187"/>
+              <a:gd name="connsiteY2" fmla="*/ 1216312 h 1216312"/>
+              <a:gd name="connsiteX3" fmla="*/ 0 w 2027187"/>
+              <a:gd name="connsiteY3" fmla="*/ 1216312 h 1216312"/>
+              <a:gd name="connsiteX4" fmla="*/ 0 w 2027187"/>
+              <a:gd name="connsiteY4" fmla="*/ 0 h 1216312"/>
+            </a:gdLst>
+            <a:ahLst/>
+            <a:cxnLst>
+              <a:cxn ang="0">
+                <a:pos x="connsiteX0" y="connsiteY0"/>
+              </a:cxn>
+              <a:cxn ang="0">
+                <a:pos x="connsiteX1" y="connsiteY1"/>
+              </a:cxn>
+              <a:cxn ang="0">
+                <a:pos x="connsiteX2" y="connsiteY2"/>
+              </a:cxn>
+              <a:cxn ang="0">
+                <a:pos x="connsiteX3" y="connsiteY3"/>
+              </a:cxn>
+              <a:cxn ang="0">
+                <a:pos x="connsiteX4" y="connsiteY4"/>
+              </a:cxn>
+            </a:cxnLst>
+            <a:rect l="l" t="t" r="r" b="b"/>
+            <a:pathLst>
+              <a:path w="2027187" h="1216312">
+                <a:moveTo>
+                  <a:pt x="0" y="0"/>
+                </a:moveTo>
+                <a:lnTo>
+                  <a:pt x="2027187" y="0"/>
+                </a:lnTo>
+                <a:lnTo>
+                  <a:pt x="2027187" y="1216312"/>
+                </a:lnTo>
+                <a:lnTo>
+                  <a:pt x="0" y="1216312"/>
+                </a:lnTo>
+                <a:lnTo>
+                  <a:pt x="0" y="0"/>
+                </a:lnTo>
+                <a:close/>
+              </a:path>
+            </a:pathLst>
+          </a:custGeom>
+          <a:solidFill>
+            <a:schemeClr val="accent2"/>
+          </a:solidFill>
+        </p:spPr>
+        <p:style>
+          <a:lnRef idx="2">
+            <a:schemeClr val="lt1">
+              <a:hueOff val="0"/>
+              <a:satOff val="0"/>
+              <a:lumOff val="0"/>
+              <a:alphaOff val="0"/>
+            </a:schemeClr>
+          </a:lnRef>
+          <a:fillRef idx="1">
+            <a:schemeClr val="accent1">
+              <a:hueOff val="0"/>
+              <a:satOff val="0"/>
+              <a:lumOff val="0"/>
+              <a:alphaOff val="0"/>
+            </a:schemeClr>
+          </a:fillRef>
+          <a:effectRef idx="0">
+            <a:schemeClr val="accent1">
+              <a:hueOff val="0"/>
+              <a:satOff val="0"/>
+              <a:lumOff val="0"/>
+              <a:alphaOff val="0"/>
+            </a:schemeClr>
+          </a:effectRef>
+          <a:fontRef idx="minor">
+            <a:schemeClr val="lt1"/>
+          </a:fontRef>
+        </p:style>
+        <p:txBody>
+          <a:bodyPr spcFirstLastPara="0" vert="horz" wrap="square" lIns="118110" tIns="118110" rIns="118110" bIns="118110" numCol="1" spcCol="1270" anchor="ctr" anchorCtr="0">
+            <a:noAutofit/>
+          </a:bodyPr>
+          <a:lstStyle/>
+          <a:p>
+            <a:pPr lvl="0" algn="ctr" defTabSz="1377950">
+              <a:lnSpc>
+                <a:spcPct val="90000"/>
+              </a:lnSpc>
+              <a:spcBef>
+                <a:spcPct val="0"/>
+              </a:spcBef>
+              <a:spcAft>
+                <a:spcPct val="35000"/>
+              </a:spcAft>
+            </a:pPr>
+            <a:r>
+              <a:rPr lang="en-US" sz="3100" kern="1200" dirty="0" smtClean="0"/>
+              <a:t>Projects</a:t>
+            </a:r>
+            <a:endParaRPr lang="en-US" sz="3100" kern="1200" dirty="0"/>
+          </a:p>
+        </p:txBody>
+      </p:sp>
+      <p:cxnSp>
+        <p:nvCxnSpPr>
+          <p:cNvPr id="43" name="Straight Arrow Connector 42"/>
+          <p:cNvCxnSpPr/>
+          <p:nvPr/>
+        </p:nvCxnSpPr>
+        <p:spPr>
+          <a:xfrm>
+            <a:off x="2485822" y="2344833"/>
+            <a:ext cx="1247978" cy="0"/>
+          </a:xfrm>
+          <a:prstGeom prst="straightConnector1">
+            <a:avLst/>
+          </a:prstGeom>
+          <a:ln w="38100">
+            <a:headEnd type="arrow"/>
+            <a:tailEnd type="arrow"/>
+          </a:ln>
+        </p:spPr>
+        <p:style>
+          <a:lnRef idx="1">
+            <a:schemeClr val="accent1"/>
+          </a:lnRef>
+          <a:fillRef idx="0">
+            <a:schemeClr val="accent1"/>
+          </a:fillRef>
+          <a:effectRef idx="0">
+            <a:schemeClr val="accent1"/>
+          </a:effectRef>
+          <a:fontRef idx="minor">
+            <a:schemeClr val="tx1"/>
+          </a:fontRef>
+        </p:style>
+      </p:cxnSp>
+      <p:cxnSp>
+        <p:nvCxnSpPr>
+          <p:cNvPr id="64" name="Curved Connector 63"/>
+          <p:cNvCxnSpPr/>
+          <p:nvPr/>
+        </p:nvCxnSpPr>
+        <p:spPr>
+          <a:xfrm>
+            <a:off x="4747393" y="2952989"/>
+            <a:ext cx="891407" cy="589904"/>
+          </a:xfrm>
+          <a:prstGeom prst="straightConnector1">
+            <a:avLst/>
+          </a:prstGeom>
+          <a:ln w="38100">
+            <a:headEnd type="arrow"/>
+            <a:tailEnd type="arrow"/>
+          </a:ln>
+        </p:spPr>
+        <p:style>
+          <a:lnRef idx="1">
+            <a:schemeClr val="accent1"/>
+          </a:lnRef>
+          <a:fillRef idx="0">
+            <a:schemeClr val="accent1"/>
+          </a:fillRef>
+          <a:effectRef idx="0">
+            <a:schemeClr val="accent1"/>
+          </a:effectRef>
+          <a:fontRef idx="minor">
+            <a:schemeClr val="tx1"/>
+          </a:fontRef>
+        </p:style>
+      </p:cxnSp>
+      <p:cxnSp>
+        <p:nvCxnSpPr>
+          <p:cNvPr id="70" name="Straight Arrow Connector 69"/>
+          <p:cNvCxnSpPr/>
+          <p:nvPr/>
+        </p:nvCxnSpPr>
+        <p:spPr>
+          <a:xfrm flipH="1">
+            <a:off x="7023409" y="2952989"/>
+            <a:ext cx="865135" cy="583690"/>
+          </a:xfrm>
+          <a:prstGeom prst="straightConnector1">
+            <a:avLst/>
+          </a:prstGeom>
+          <a:ln w="38100">
+            <a:headEnd type="arrow"/>
+            <a:tailEnd type="arrow"/>
+          </a:ln>
+        </p:spPr>
+        <p:style>
+          <a:lnRef idx="1">
+            <a:schemeClr val="accent1"/>
+          </a:lnRef>
+          <a:fillRef idx="0">
+            <a:schemeClr val="accent1"/>
+          </a:fillRef>
+          <a:effectRef idx="0">
+            <a:schemeClr val="accent1"/>
+          </a:effectRef>
+          <a:fontRef idx="minor">
+            <a:schemeClr val="tx1"/>
+          </a:fontRef>
+        </p:style>
+      </p:cxnSp>
+      <p:cxnSp>
+        <p:nvCxnSpPr>
+          <p:cNvPr id="74" name="Curved Connector 73"/>
+          <p:cNvCxnSpPr/>
+          <p:nvPr/>
+        </p:nvCxnSpPr>
+        <p:spPr>
+          <a:xfrm>
+            <a:off x="2164532" y="3536679"/>
+            <a:ext cx="2287092" cy="1060727"/>
+          </a:xfrm>
+          <a:prstGeom prst="curvedConnector3">
+            <a:avLst>
+              <a:gd name="adj1" fmla="val 49584"/>
+            </a:avLst>
+          </a:prstGeom>
+          <a:ln w="38100">
+            <a:headEnd type="arrow"/>
+            <a:tailEnd type="arrow"/>
+          </a:ln>
+        </p:spPr>
+        <p:style>
+          <a:lnRef idx="1">
+            <a:schemeClr val="accent1"/>
+          </a:lnRef>
+          <a:fillRef idx="0">
+            <a:schemeClr val="accent1"/>
+          </a:fillRef>
+          <a:effectRef idx="0">
+            <a:schemeClr val="accent1"/>
+          </a:effectRef>
+          <a:fontRef idx="minor">
+            <a:schemeClr val="tx1"/>
+          </a:fontRef>
+        </p:style>
+      </p:cxnSp>
+      <p:cxnSp>
+        <p:nvCxnSpPr>
+          <p:cNvPr id="76" name="Curved Connector 75"/>
+          <p:cNvCxnSpPr/>
+          <p:nvPr/>
+        </p:nvCxnSpPr>
+        <p:spPr>
+          <a:xfrm flipV="1">
+            <a:off x="5802651" y="2952989"/>
+            <a:ext cx="2198349" cy="1634343"/>
+          </a:xfrm>
+          <a:prstGeom prst="curvedConnector3">
+            <a:avLst>
+              <a:gd name="adj1" fmla="val 100260"/>
+            </a:avLst>
+          </a:prstGeom>
+          <a:ln w="38100">
+            <a:headEnd type="arrow"/>
+            <a:tailEnd type="arrow"/>
+          </a:ln>
+        </p:spPr>
+        <p:style>
+          <a:lnRef idx="1">
+            <a:schemeClr val="accent1"/>
+          </a:lnRef>
+          <a:fillRef idx="0">
+            <a:schemeClr val="accent1"/>
+          </a:fillRef>
+          <a:effectRef idx="0">
+            <a:schemeClr val="accent1"/>
+          </a:effectRef>
+          <a:fontRef idx="minor">
+            <a:schemeClr val="tx1"/>
+          </a:fontRef>
+        </p:style>
+      </p:cxnSp>
+    </p:spTree>
+    <p:extLst>
+      <p:ext uri="{BB962C8B-B14F-4D97-AF65-F5344CB8AC3E}">
+        <p14:creationId xmlns:p14="http://schemas.microsoft.com/office/powerpoint/2010/main" val="281827384"/>
+      </p:ext>
+    </p:extLst>
+  </p:cSld>
+  <p:clrMapOvr>
+    <a:masterClrMapping/>
+  </p:clrMapOvr>
+  <p:timing>
+    <p:tnLst>
+      <p:par>
+        <p:cTn id="1" dur="indefinite" restart="never" nodeType="tmRoot">
+          <p:childTnLst>
+            <p:seq concurrent="1" nextAc="seek">
+              <p:cTn id="2" dur="indefinite" nodeType="mainSeq">
+                <p:childTnLst>
+                  <p:par>
+                    <p:cTn id="3" fill="hold">
+                      <p:stCondLst>
+                        <p:cond delay="indefinite"/>
+                      </p:stCondLst>
+                      <p:childTnLst>
+                        <p:par>
+                          <p:cTn id="4" fill="hold">
+                            <p:stCondLst>
+                              <p:cond delay="0"/>
+                            </p:stCondLst>
+                            <p:childTnLst>
+                              <p:par>
+                                <p:cTn id="5" presetID="10" presetClass="entr" presetSubtype="0" fill="hold" grpId="0" nodeType="clickEffect">
+                                  <p:stCondLst>
+                                    <p:cond delay="0"/>
+                                  </p:stCondLst>
+                                  <p:childTnLst>
+                                    <p:set>
+                                      <p:cBhvr>
+                                        <p:cTn id="6" dur="1" fill="hold">
+                                          <p:stCondLst>
+                                            <p:cond delay="0"/>
+                                          </p:stCondLst>
+                                        </p:cTn>
+                                        <p:tgtEl>
+                                          <p:spTgt spid="2"/>
+                                        </p:tgtEl>
+                                        <p:attrNameLst>
+                                          <p:attrName>style.visibility</p:attrName>
+                                        </p:attrNameLst>
+                                      </p:cBhvr>
+                                      <p:to>
+                                        <p:strVal val="visible"/>
+                                      </p:to>
+                                    </p:set>
+                                    <p:animEffect transition="in" filter="fade">
+                                      <p:cBhvr>
+                                        <p:cTn id="7" dur="500"/>
+                                        <p:tgtEl>
+                                          <p:spTgt spid="2"/>
+                                        </p:tgtEl>
+                                      </p:cBhvr>
+                                    </p:animEffect>
+                                  </p:childTnLst>
+                                </p:cTn>
+                              </p:par>
+                            </p:childTnLst>
+                          </p:cTn>
+                        </p:par>
+                      </p:childTnLst>
+                    </p:cTn>
+                  </p:par>
+                  <p:par>
+                    <p:cTn id="8" fill="hold">
+                      <p:stCondLst>
+                        <p:cond delay="indefinite"/>
+                      </p:stCondLst>
+                      <p:childTnLst>
+                        <p:par>
+                          <p:cTn id="9" fill="hold">
+                            <p:stCondLst>
+                              <p:cond delay="0"/>
+                            </p:stCondLst>
+                            <p:childTnLst>
+                              <p:par>
+                                <p:cTn id="10" presetID="10" presetClass="entr" presetSubtype="0" fill="hold" grpId="0" nodeType="clickEffect">
+                                  <p:stCondLst>
+                                    <p:cond delay="0"/>
+                                  </p:stCondLst>
+                                  <p:childTnLst>
+                                    <p:set>
+                                      <p:cBhvr>
+                                        <p:cTn id="11" dur="1" fill="hold">
+                                          <p:stCondLst>
+                                            <p:cond delay="0"/>
+                                          </p:stCondLst>
+                                        </p:cTn>
+                                        <p:tgtEl>
+                                          <p:spTgt spid="14"/>
+                                        </p:tgtEl>
+                                        <p:attrNameLst>
+                                          <p:attrName>style.visibility</p:attrName>
+                                        </p:attrNameLst>
+                                      </p:cBhvr>
+                                      <p:to>
+                                        <p:strVal val="visible"/>
+                                      </p:to>
+                                    </p:set>
+                                    <p:animEffect transition="in" filter="fade">
+                                      <p:cBhvr>
+                                        <p:cTn id="12" dur="500"/>
+                                        <p:tgtEl>
+                                          <p:spTgt spid="14"/>
+                                        </p:tgtEl>
+                                      </p:cBhvr>
+                                    </p:animEffect>
+                                  </p:childTnLst>
+                                </p:cTn>
+                              </p:par>
+                              <p:par>
+                                <p:cTn id="13" presetID="10" presetClass="entr" presetSubtype="0" fill="hold" grpId="0" nodeType="withEffect">
+                                  <p:stCondLst>
+                                    <p:cond delay="0"/>
+                                  </p:stCondLst>
+                                  <p:childTnLst>
+                                    <p:set>
+                                      <p:cBhvr>
+                                        <p:cTn id="14" dur="1" fill="hold">
+                                          <p:stCondLst>
+                                            <p:cond delay="0"/>
+                                          </p:stCondLst>
+                                        </p:cTn>
+                                        <p:tgtEl>
+                                          <p:spTgt spid="15"/>
+                                        </p:tgtEl>
+                                        <p:attrNameLst>
+                                          <p:attrName>style.visibility</p:attrName>
+                                        </p:attrNameLst>
+                                      </p:cBhvr>
+                                      <p:to>
+                                        <p:strVal val="visible"/>
+                                      </p:to>
+                                    </p:set>
+                                    <p:animEffect transition="in" filter="fade">
+                                      <p:cBhvr>
+                                        <p:cTn id="15" dur="500"/>
+                                        <p:tgtEl>
+                                          <p:spTgt spid="15"/>
+                                        </p:tgtEl>
+                                      </p:cBhvr>
+                                    </p:animEffect>
+                                  </p:childTnLst>
+                                </p:cTn>
+                              </p:par>
+                              <p:par>
+                                <p:cTn id="16" presetID="10" presetClass="entr" presetSubtype="0" fill="hold" grpId="0" nodeType="withEffect">
+                                  <p:stCondLst>
+                                    <p:cond delay="0"/>
+                                  </p:stCondLst>
+                                  <p:childTnLst>
+                                    <p:set>
+                                      <p:cBhvr>
+                                        <p:cTn id="17" dur="1" fill="hold">
+                                          <p:stCondLst>
+                                            <p:cond delay="0"/>
+                                          </p:stCondLst>
+                                        </p:cTn>
+                                        <p:tgtEl>
+                                          <p:spTgt spid="17"/>
+                                        </p:tgtEl>
+                                        <p:attrNameLst>
+                                          <p:attrName>style.visibility</p:attrName>
+                                        </p:attrNameLst>
+                                      </p:cBhvr>
+                                      <p:to>
+                                        <p:strVal val="visible"/>
+                                      </p:to>
+                                    </p:set>
+                                    <p:animEffect transition="in" filter="fade">
+                                      <p:cBhvr>
+                                        <p:cTn id="18" dur="500"/>
+                                        <p:tgtEl>
+                                          <p:spTgt spid="17"/>
+                                        </p:tgtEl>
+                                      </p:cBhvr>
+                                    </p:animEffect>
+                                  </p:childTnLst>
+                                </p:cTn>
+                              </p:par>
+                            </p:childTnLst>
+                          </p:cTn>
+                        </p:par>
+                      </p:childTnLst>
+                    </p:cTn>
+                  </p:par>
+                  <p:par>
+                    <p:cTn id="19" fill="hold">
+                      <p:stCondLst>
+                        <p:cond delay="indefinite"/>
+                      </p:stCondLst>
+                      <p:childTnLst>
+                        <p:par>
+                          <p:cTn id="20" fill="hold">
+                            <p:stCondLst>
+                              <p:cond delay="0"/>
+                            </p:stCondLst>
+                            <p:childTnLst>
+                              <p:par>
+                                <p:cTn id="21" presetID="10" presetClass="entr" presetSubtype="0" fill="hold" nodeType="clickEffect">
+                                  <p:stCondLst>
+                                    <p:cond delay="0"/>
+                                  </p:stCondLst>
+                                  <p:childTnLst>
+                                    <p:set>
+                                      <p:cBhvr>
+                                        <p:cTn id="22" dur="1" fill="hold">
+                                          <p:stCondLst>
+                                            <p:cond delay="0"/>
+                                          </p:stCondLst>
+                                        </p:cTn>
+                                        <p:tgtEl>
+                                          <p:spTgt spid="43"/>
+                                        </p:tgtEl>
+                                        <p:attrNameLst>
+                                          <p:attrName>style.visibility</p:attrName>
+                                        </p:attrNameLst>
+                                      </p:cBhvr>
+                                      <p:to>
+                                        <p:strVal val="visible"/>
+                                      </p:to>
+                                    </p:set>
+                                    <p:animEffect transition="in" filter="fade">
+                                      <p:cBhvr>
+                                        <p:cTn id="23" dur="500"/>
+                                        <p:tgtEl>
+                                          <p:spTgt spid="43"/>
+                                        </p:tgtEl>
+                                      </p:cBhvr>
+                                    </p:animEffect>
+                                  </p:childTnLst>
+                                </p:cTn>
+                              </p:par>
+                              <p:par>
+                                <p:cTn id="24" presetID="10" presetClass="entr" presetSubtype="0" fill="hold" grpId="0" nodeType="withEffect">
+                                  <p:stCondLst>
+                                    <p:cond delay="0"/>
+                                  </p:stCondLst>
+                                  <p:childTnLst>
+                                    <p:set>
+                                      <p:cBhvr>
+                                        <p:cTn id="25" dur="1" fill="hold">
+                                          <p:stCondLst>
+                                            <p:cond delay="0"/>
+                                          </p:stCondLst>
+                                        </p:cTn>
+                                        <p:tgtEl>
+                                          <p:spTgt spid="99"/>
+                                        </p:tgtEl>
+                                        <p:attrNameLst>
+                                          <p:attrName>style.visibility</p:attrName>
+                                        </p:attrNameLst>
+                                      </p:cBhvr>
+                                      <p:to>
+                                        <p:strVal val="visible"/>
+                                      </p:to>
+                                    </p:set>
+                                    <p:animEffect transition="in" filter="fade">
+                                      <p:cBhvr>
+                                        <p:cTn id="26" dur="500"/>
+                                        <p:tgtEl>
+                                          <p:spTgt spid="99"/>
+                                        </p:tgtEl>
+                                      </p:cBhvr>
+                                    </p:animEffect>
+                                  </p:childTnLst>
+                                </p:cTn>
+                              </p:par>
+                            </p:childTnLst>
+                          </p:cTn>
+                        </p:par>
+                      </p:childTnLst>
+                    </p:cTn>
+                  </p:par>
+                  <p:par>
+                    <p:cTn id="27" fill="hold">
+                      <p:stCondLst>
+                        <p:cond delay="indefinite"/>
+                      </p:stCondLst>
+                      <p:childTnLst>
+                        <p:par>
+                          <p:cTn id="28" fill="hold">
+                            <p:stCondLst>
+                              <p:cond delay="0"/>
+                            </p:stCondLst>
+                            <p:childTnLst>
+                              <p:par>
+                                <p:cTn id="29" presetID="10" presetClass="entr" presetSubtype="0" fill="hold" nodeType="clickEffect">
+                                  <p:stCondLst>
+                                    <p:cond delay="0"/>
+                                  </p:stCondLst>
+                                  <p:childTnLst>
+                                    <p:set>
+                                      <p:cBhvr>
+                                        <p:cTn id="30" dur="1" fill="hold">
+                                          <p:stCondLst>
+                                            <p:cond delay="0"/>
+                                          </p:stCondLst>
+                                        </p:cTn>
+                                        <p:tgtEl>
+                                          <p:spTgt spid="64"/>
+                                        </p:tgtEl>
+                                        <p:attrNameLst>
+                                          <p:attrName>style.visibility</p:attrName>
+                                        </p:attrNameLst>
+                                      </p:cBhvr>
+                                      <p:to>
+                                        <p:strVal val="visible"/>
+                                      </p:to>
+                                    </p:set>
+                                    <p:animEffect transition="in" filter="fade">
+                                      <p:cBhvr>
+                                        <p:cTn id="31" dur="500"/>
+                                        <p:tgtEl>
+                                          <p:spTgt spid="64"/>
+                                        </p:tgtEl>
+                                      </p:cBhvr>
+                                    </p:animEffect>
+                                  </p:childTnLst>
+                                </p:cTn>
+                              </p:par>
+                              <p:par>
+                                <p:cTn id="32" presetID="10" presetClass="entr" presetSubtype="0" fill="hold" grpId="0" nodeType="withEffect">
+                                  <p:stCondLst>
+                                    <p:cond delay="0"/>
+                                  </p:stCondLst>
+                                  <p:childTnLst>
+                                    <p:set>
+                                      <p:cBhvr>
+                                        <p:cTn id="33" dur="1" fill="hold">
+                                          <p:stCondLst>
+                                            <p:cond delay="0"/>
+                                          </p:stCondLst>
+                                        </p:cTn>
+                                        <p:tgtEl>
+                                          <p:spTgt spid="16"/>
+                                        </p:tgtEl>
+                                        <p:attrNameLst>
+                                          <p:attrName>style.visibility</p:attrName>
+                                        </p:attrNameLst>
+                                      </p:cBhvr>
+                                      <p:to>
+                                        <p:strVal val="visible"/>
+                                      </p:to>
+                                    </p:set>
+                                    <p:animEffect transition="in" filter="fade">
+                                      <p:cBhvr>
+                                        <p:cTn id="34" dur="500"/>
+                                        <p:tgtEl>
+                                          <p:spTgt spid="16"/>
+                                        </p:tgtEl>
+                                      </p:cBhvr>
+                                    </p:animEffect>
+                                  </p:childTnLst>
+                                </p:cTn>
+                              </p:par>
+                              <p:par>
+                                <p:cTn id="35" presetID="10" presetClass="entr" presetSubtype="0" fill="hold" nodeType="withEffect">
+                                  <p:stCondLst>
+                                    <p:cond delay="0"/>
+                                  </p:stCondLst>
+                                  <p:childTnLst>
+                                    <p:set>
+                                      <p:cBhvr>
+                                        <p:cTn id="36" dur="1" fill="hold">
+                                          <p:stCondLst>
+                                            <p:cond delay="0"/>
+                                          </p:stCondLst>
+                                        </p:cTn>
+                                        <p:tgtEl>
+                                          <p:spTgt spid="70"/>
+                                        </p:tgtEl>
+                                        <p:attrNameLst>
+                                          <p:attrName>style.visibility</p:attrName>
+                                        </p:attrNameLst>
+                                      </p:cBhvr>
+                                      <p:to>
+                                        <p:strVal val="visible"/>
+                                      </p:to>
+                                    </p:set>
+                                    <p:animEffect transition="in" filter="fade">
+                                      <p:cBhvr>
+                                        <p:cTn id="37" dur="500"/>
+                                        <p:tgtEl>
+                                          <p:spTgt spid="70"/>
+                                        </p:tgtEl>
+                                      </p:cBhvr>
+                                    </p:animEffect>
+                                  </p:childTnLst>
+                                </p:cTn>
+                              </p:par>
+                            </p:childTnLst>
+                          </p:cTn>
+                        </p:par>
+                      </p:childTnLst>
+                    </p:cTn>
+                  </p:par>
+                  <p:par>
+                    <p:cTn id="38" fill="hold">
+                      <p:stCondLst>
+                        <p:cond delay="indefinite"/>
+                      </p:stCondLst>
+                      <p:childTnLst>
+                        <p:par>
+                          <p:cTn id="39" fill="hold">
+                            <p:stCondLst>
+                              <p:cond delay="0"/>
+                            </p:stCondLst>
+                            <p:childTnLst>
+                              <p:par>
+                                <p:cTn id="40" presetID="10" presetClass="entr" presetSubtype="0" fill="hold" nodeType="clickEffect">
+                                  <p:stCondLst>
+                                    <p:cond delay="0"/>
+                                  </p:stCondLst>
+                                  <p:childTnLst>
+                                    <p:set>
+                                      <p:cBhvr>
+                                        <p:cTn id="41" dur="1" fill="hold">
+                                          <p:stCondLst>
+                                            <p:cond delay="0"/>
+                                          </p:stCondLst>
+                                        </p:cTn>
+                                        <p:tgtEl>
+                                          <p:spTgt spid="62"/>
+                                        </p:tgtEl>
+                                        <p:attrNameLst>
+                                          <p:attrName>style.visibility</p:attrName>
+                                        </p:attrNameLst>
+                                      </p:cBhvr>
+                                      <p:to>
+                                        <p:strVal val="visible"/>
+                                      </p:to>
+                                    </p:set>
+                                    <p:animEffect transition="in" filter="fade">
+                                      <p:cBhvr>
+                                        <p:cTn id="42" dur="500"/>
+                                        <p:tgtEl>
+                                          <p:spTgt spid="62"/>
+                                        </p:tgtEl>
+                                      </p:cBhvr>
+                                    </p:animEffect>
+                                  </p:childTnLst>
+                                </p:cTn>
+                              </p:par>
+                              <p:par>
+                                <p:cTn id="43" presetID="10" presetClass="entr" presetSubtype="0" fill="hold" grpId="0" nodeType="withEffect">
+                                  <p:stCondLst>
+                                    <p:cond delay="0"/>
+                                  </p:stCondLst>
+                                  <p:childTnLst>
+                                    <p:set>
+                                      <p:cBhvr>
+                                        <p:cTn id="44" dur="1" fill="hold">
+                                          <p:stCondLst>
+                                            <p:cond delay="0"/>
+                                          </p:stCondLst>
+                                        </p:cTn>
+                                        <p:tgtEl>
+                                          <p:spTgt spid="21"/>
+                                        </p:tgtEl>
+                                        <p:attrNameLst>
+                                          <p:attrName>style.visibility</p:attrName>
+                                        </p:attrNameLst>
+                                      </p:cBhvr>
+                                      <p:to>
+                                        <p:strVal val="visible"/>
+                                      </p:to>
+                                    </p:set>
+                                    <p:animEffect transition="in" filter="fade">
+                                      <p:cBhvr>
+                                        <p:cTn id="45" dur="500"/>
+                                        <p:tgtEl>
+                                          <p:spTgt spid="21"/>
+                                        </p:tgtEl>
+                                      </p:cBhvr>
+                                    </p:animEffect>
+                                  </p:childTnLst>
+                                </p:cTn>
+                              </p:par>
+                              <p:par>
+                                <p:cTn id="46" presetID="10" presetClass="entr" presetSubtype="0" fill="hold" nodeType="withEffect">
+                                  <p:stCondLst>
+                                    <p:cond delay="0"/>
+                                  </p:stCondLst>
+                                  <p:childTnLst>
+                                    <p:set>
+                                      <p:cBhvr>
+                                        <p:cTn id="47" dur="1" fill="hold">
+                                          <p:stCondLst>
+                                            <p:cond delay="0"/>
+                                          </p:stCondLst>
+                                        </p:cTn>
+                                        <p:tgtEl>
+                                          <p:spTgt spid="60"/>
+                                        </p:tgtEl>
+                                        <p:attrNameLst>
+                                          <p:attrName>style.visibility</p:attrName>
+                                        </p:attrNameLst>
+                                      </p:cBhvr>
+                                      <p:to>
+                                        <p:strVal val="visible"/>
+                                      </p:to>
+                                    </p:set>
+                                    <p:animEffect transition="in" filter="fade">
+                                      <p:cBhvr>
+                                        <p:cTn id="48" dur="500"/>
+                                        <p:tgtEl>
+                                          <p:spTgt spid="60"/>
+                                        </p:tgtEl>
+                                      </p:cBhvr>
+                                    </p:animEffect>
+                                  </p:childTnLst>
+                                </p:cTn>
+                              </p:par>
+                              <p:par>
+                                <p:cTn id="49" presetID="10" presetClass="entr" presetSubtype="0" fill="hold" grpId="0" nodeType="withEffect">
+                                  <p:stCondLst>
+                                    <p:cond delay="0"/>
+                                  </p:stCondLst>
+                                  <p:childTnLst>
+                                    <p:set>
+                                      <p:cBhvr>
+                                        <p:cTn id="50" dur="1" fill="hold">
+                                          <p:stCondLst>
+                                            <p:cond delay="0"/>
+                                          </p:stCondLst>
+                                        </p:cTn>
+                                        <p:tgtEl>
+                                          <p:spTgt spid="22"/>
+                                        </p:tgtEl>
+                                        <p:attrNameLst>
+                                          <p:attrName>style.visibility</p:attrName>
+                                        </p:attrNameLst>
+                                      </p:cBhvr>
+                                      <p:to>
+                                        <p:strVal val="visible"/>
+                                      </p:to>
+                                    </p:set>
+                                    <p:animEffect transition="in" filter="fade">
+                                      <p:cBhvr>
+                                        <p:cTn id="51" dur="500"/>
+                                        <p:tgtEl>
+                                          <p:spTgt spid="22"/>
+                                        </p:tgtEl>
+                                      </p:cBhvr>
+                                    </p:animEffect>
+                                  </p:childTnLst>
+                                </p:cTn>
+                              </p:par>
+                            </p:childTnLst>
+                          </p:cTn>
+                        </p:par>
+                      </p:childTnLst>
+                    </p:cTn>
+                  </p:par>
+                  <p:par>
+                    <p:cTn id="52" fill="hold">
+                      <p:stCondLst>
+                        <p:cond delay="indefinite"/>
+                      </p:stCondLst>
+                      <p:childTnLst>
+                        <p:par>
+                          <p:cTn id="53" fill="hold">
+                            <p:stCondLst>
+                              <p:cond delay="0"/>
+                            </p:stCondLst>
+                            <p:childTnLst>
+                              <p:par>
+                                <p:cTn id="54" presetID="10" presetClass="entr" presetSubtype="0" fill="hold" nodeType="clickEffect">
+                                  <p:stCondLst>
+                                    <p:cond delay="0"/>
+                                  </p:stCondLst>
+                                  <p:childTnLst>
+                                    <p:set>
+                                      <p:cBhvr>
+                                        <p:cTn id="55" dur="1" fill="hold">
+                                          <p:stCondLst>
+                                            <p:cond delay="0"/>
+                                          </p:stCondLst>
+                                        </p:cTn>
+                                        <p:tgtEl>
+                                          <p:spTgt spid="74"/>
+                                        </p:tgtEl>
+                                        <p:attrNameLst>
+                                          <p:attrName>style.visibility</p:attrName>
+                                        </p:attrNameLst>
+                                      </p:cBhvr>
+                                      <p:to>
+                                        <p:strVal val="visible"/>
+                                      </p:to>
+                                    </p:set>
+                                    <p:animEffect transition="in" filter="fade">
+                                      <p:cBhvr>
+                                        <p:cTn id="56" dur="500"/>
+                                        <p:tgtEl>
+                                          <p:spTgt spid="74"/>
+                                        </p:tgtEl>
+                                      </p:cBhvr>
+                                    </p:animEffect>
+                                  </p:childTnLst>
+                                </p:cTn>
+                              </p:par>
+                              <p:par>
+                                <p:cTn id="57" presetID="10" presetClass="entr" presetSubtype="0" fill="hold" grpId="0" nodeType="withEffect">
+                                  <p:stCondLst>
+                                    <p:cond delay="0"/>
+                                  </p:stCondLst>
+                                  <p:childTnLst>
+                                    <p:set>
+                                      <p:cBhvr>
+                                        <p:cTn id="58" dur="1" fill="hold">
+                                          <p:stCondLst>
+                                            <p:cond delay="0"/>
+                                          </p:stCondLst>
+                                        </p:cTn>
+                                        <p:tgtEl>
+                                          <p:spTgt spid="20"/>
+                                        </p:tgtEl>
+                                        <p:attrNameLst>
+                                          <p:attrName>style.visibility</p:attrName>
+                                        </p:attrNameLst>
+                                      </p:cBhvr>
+                                      <p:to>
+                                        <p:strVal val="visible"/>
+                                      </p:to>
+                                    </p:set>
+                                    <p:animEffect transition="in" filter="fade">
+                                      <p:cBhvr>
+                                        <p:cTn id="59" dur="500"/>
+                                        <p:tgtEl>
+                                          <p:spTgt spid="20"/>
+                                        </p:tgtEl>
+                                      </p:cBhvr>
+                                    </p:animEffect>
+                                  </p:childTnLst>
+                                </p:cTn>
+                              </p:par>
+                              <p:par>
+                                <p:cTn id="60" presetID="10" presetClass="entr" presetSubtype="0" fill="hold" nodeType="withEffect">
+                                  <p:stCondLst>
+                                    <p:cond delay="0"/>
+                                  </p:stCondLst>
+                                  <p:childTnLst>
+                                    <p:set>
+                                      <p:cBhvr>
+                                        <p:cTn id="61" dur="1" fill="hold">
+                                          <p:stCondLst>
+                                            <p:cond delay="0"/>
+                                          </p:stCondLst>
+                                        </p:cTn>
+                                        <p:tgtEl>
+                                          <p:spTgt spid="76"/>
+                                        </p:tgtEl>
+                                        <p:attrNameLst>
+                                          <p:attrName>style.visibility</p:attrName>
+                                        </p:attrNameLst>
+                                      </p:cBhvr>
+                                      <p:to>
+                                        <p:strVal val="visible"/>
+                                      </p:to>
+                                    </p:set>
+                                    <p:animEffect transition="in" filter="fade">
+                                      <p:cBhvr>
+                                        <p:cTn id="62" dur="500"/>
+                                        <p:tgtEl>
+                                          <p:spTgt spid="76"/>
+                                        </p:tgtEl>
+                                      </p:cBhvr>
+                                    </p:animEffect>
+                                  </p:childTnLst>
+                                </p:cTn>
+                              </p:par>
+                            </p:childTnLst>
+                          </p:cTn>
+                        </p:par>
+                      </p:childTnLst>
+                    </p:cTn>
+                  </p:par>
+                </p:childTnLst>
+              </p:cTn>
+              <p:prevCondLst>
+                <p:cond evt="onPrev" delay="0">
+                  <p:tgtEl>
+                    <p:sldTgt/>
+                  </p:tgtEl>
+                </p:cond>
+              </p:prevCondLst>
+              <p:nextCondLst>
+                <p:cond evt="onNext" delay="0">
+                  <p:tgtEl>
+                    <p:sldTgt/>
+                  </p:tgtEl>
+                </p:cond>
+              </p:nextCondLst>
+            </p:seq>
+          </p:childTnLst>
+        </p:cTn>
+      </p:par>
+    </p:tnLst>
+    <p:bldLst>
+      <p:bldP spid="99" grpId="0" animBg="1"/>
+      <p:bldP spid="2" grpId="0"/>
+      <p:bldP spid="15" grpId="0" animBg="1"/>
+      <p:bldP spid="16" grpId="0" animBg="1"/>
+      <p:bldP spid="20" grpId="0" animBg="1"/>
+      <p:bldP spid="21" grpId="0" animBg="1"/>
+      <p:bldP spid="22" grpId="0" animBg="1"/>
+      <p:bldP spid="17" grpId="0" animBg="1"/>
+      <p:bldP spid="14" grpId="0" animBg="1"/>
+    </p:bldLst>
+  </p:timing>
+</p:sld>
+</file>
+
+<file path=ppt/slides/slide6.xml><?xml version="1.0" encoding="utf-8"?>
+<p:sld xmlns:a="http://schemas.openxmlformats.org/drawingml/2006/main" xmlns:r="http://schemas.openxmlformats.org/officeDocument/2006/relationships" xmlns:p="http://schemas.openxmlformats.org/presentationml/2006/main">
+  <p:cSld>
+    <p:spTree>
+      <p:nvGrpSpPr>
+        <p:cNvPr id="1" name=""/>
+        <p:cNvGrpSpPr/>
+        <p:nvPr/>
+      </p:nvGrpSpPr>
+      <p:grpSpPr>
+        <a:xfrm>
+          <a:off x="0" y="0"/>
+          <a:ext cx="0" cy="0"/>
+          <a:chOff x="0" y="0"/>
+          <a:chExt cx="0" cy="0"/>
+        </a:xfrm>
+      </p:grpSpPr>
+      <p:sp>
+        <p:nvSpPr>
           <p:cNvPr id="2" name="Title 1"/>
           <p:cNvSpPr>
             <a:spLocks noGrp="1"/>

</xml_diff>